<commit_message>
Begin writing project report
</commit_message>
<xml_diff>
--- a/Framing_Presentation.pptx
+++ b/Framing_Presentation.pptx
@@ -4109,7 +4109,7 @@
 <dgm:dataModel xmlns:dgm="http://schemas.openxmlformats.org/drawingml/2006/diagram" xmlns:a="http://schemas.openxmlformats.org/drawingml/2006/main">
   <dgm:ptLst>
     <dgm:pt modelId="{C22BCB02-1EB7-4EB2-9304-339B32B0F4A8}" type="doc">
-      <dgm:prSet loTypeId="urn:microsoft.com/office/officeart/2008/layout/LinedList" loCatId="list" qsTypeId="urn:microsoft.com/office/officeart/2005/8/quickstyle/simple1" qsCatId="simple" csTypeId="urn:microsoft.com/office/officeart/2005/8/colors/colorful2" csCatId="colorful"/>
+      <dgm:prSet loTypeId="urn:microsoft.com/office/officeart/2008/layout/LinedList" loCatId="list" qsTypeId="urn:microsoft.com/office/officeart/2005/8/quickstyle/simple1" qsCatId="simple" csTypeId="urn:microsoft.com/office/officeart/2005/8/colors/colorful2" csCatId="colorful" phldr="1"/>
       <dgm:spPr/>
       <dgm:t>
         <a:bodyPr/>
@@ -4127,8 +4127,8 @@
         <a:lstStyle/>
         <a:p>
           <a:r>
-            <a:rPr lang="en-US"/>
-            <a:t>Generalized Linear Model </a:t>
+            <a:rPr lang="en-US" dirty="0"/>
+            <a:t>Similar to Generalized Linear Model </a:t>
           </a:r>
         </a:p>
       </dgm:t>
@@ -4163,7 +4163,7 @@
         <a:lstStyle/>
         <a:p>
           <a:r>
-            <a:rPr lang="en-US"/>
+            <a:rPr lang="en-US" dirty="0"/>
             <a:t>Systematic component consists of smoothing functions on covariates</a:t>
           </a:r>
         </a:p>
@@ -5361,8 +5361,8 @@
             <a:buNone/>
           </a:pPr>
           <a:r>
-            <a:rPr lang="en-US" sz="3700" kern="1200"/>
-            <a:t>Generalized Linear Model </a:t>
+            <a:rPr lang="en-US" sz="3700" kern="1200" dirty="0"/>
+            <a:t>Similar to Generalized Linear Model </a:t>
           </a:r>
         </a:p>
       </dsp:txBody>
@@ -5471,7 +5471,7 @@
             <a:buNone/>
           </a:pPr>
           <a:r>
-            <a:rPr lang="en-US" sz="3700" kern="1200"/>
+            <a:rPr lang="en-US" sz="3700" kern="1200" dirty="0"/>
             <a:t>Systematic component consists of smoothing functions on covariates</a:t>
           </a:r>
         </a:p>
@@ -14360,7 +14360,7 @@
           <a:p>
             <a:fld id="{0E82FDCF-6042-5A4E-A2A7-A5FDD0C63025}" type="datetimeFigureOut">
               <a:rPr lang="en-US" smtClean="0"/>
-              <a:t>12/4/21</a:t>
+              <a:t>12/7/21</a:t>
             </a:fld>
             <a:endParaRPr lang="en-US"/>
           </a:p>
@@ -14558,7 +14558,7 @@
           <a:p>
             <a:fld id="{0E82FDCF-6042-5A4E-A2A7-A5FDD0C63025}" type="datetimeFigureOut">
               <a:rPr lang="en-US" smtClean="0"/>
-              <a:t>12/4/21</a:t>
+              <a:t>12/7/21</a:t>
             </a:fld>
             <a:endParaRPr lang="en-US"/>
           </a:p>
@@ -14766,7 +14766,7 @@
           <a:p>
             <a:fld id="{0E82FDCF-6042-5A4E-A2A7-A5FDD0C63025}" type="datetimeFigureOut">
               <a:rPr lang="en-US" smtClean="0"/>
-              <a:t>12/4/21</a:t>
+              <a:t>12/7/21</a:t>
             </a:fld>
             <a:endParaRPr lang="en-US"/>
           </a:p>
@@ -14964,7 +14964,7 @@
           <a:p>
             <a:fld id="{0E82FDCF-6042-5A4E-A2A7-A5FDD0C63025}" type="datetimeFigureOut">
               <a:rPr lang="en-US" smtClean="0"/>
-              <a:t>12/4/21</a:t>
+              <a:t>12/7/21</a:t>
             </a:fld>
             <a:endParaRPr lang="en-US"/>
           </a:p>
@@ -15239,7 +15239,7 @@
           <a:p>
             <a:fld id="{0E82FDCF-6042-5A4E-A2A7-A5FDD0C63025}" type="datetimeFigureOut">
               <a:rPr lang="en-US" smtClean="0"/>
-              <a:t>12/4/21</a:t>
+              <a:t>12/7/21</a:t>
             </a:fld>
             <a:endParaRPr lang="en-US"/>
           </a:p>
@@ -15504,7 +15504,7 @@
           <a:p>
             <a:fld id="{0E82FDCF-6042-5A4E-A2A7-A5FDD0C63025}" type="datetimeFigureOut">
               <a:rPr lang="en-US" smtClean="0"/>
-              <a:t>12/4/21</a:t>
+              <a:t>12/7/21</a:t>
             </a:fld>
             <a:endParaRPr lang="en-US"/>
           </a:p>
@@ -15916,7 +15916,7 @@
           <a:p>
             <a:fld id="{0E82FDCF-6042-5A4E-A2A7-A5FDD0C63025}" type="datetimeFigureOut">
               <a:rPr lang="en-US" smtClean="0"/>
-              <a:t>12/4/21</a:t>
+              <a:t>12/7/21</a:t>
             </a:fld>
             <a:endParaRPr lang="en-US"/>
           </a:p>
@@ -16057,7 +16057,7 @@
           <a:p>
             <a:fld id="{0E82FDCF-6042-5A4E-A2A7-A5FDD0C63025}" type="datetimeFigureOut">
               <a:rPr lang="en-US" smtClean="0"/>
-              <a:t>12/4/21</a:t>
+              <a:t>12/7/21</a:t>
             </a:fld>
             <a:endParaRPr lang="en-US"/>
           </a:p>
@@ -16170,7 +16170,7 @@
           <a:p>
             <a:fld id="{0E82FDCF-6042-5A4E-A2A7-A5FDD0C63025}" type="datetimeFigureOut">
               <a:rPr lang="en-US" smtClean="0"/>
-              <a:t>12/4/21</a:t>
+              <a:t>12/7/21</a:t>
             </a:fld>
             <a:endParaRPr lang="en-US"/>
           </a:p>
@@ -16481,7 +16481,7 @@
           <a:p>
             <a:fld id="{0E82FDCF-6042-5A4E-A2A7-A5FDD0C63025}" type="datetimeFigureOut">
               <a:rPr lang="en-US" smtClean="0"/>
-              <a:t>12/4/21</a:t>
+              <a:t>12/7/21</a:t>
             </a:fld>
             <a:endParaRPr lang="en-US"/>
           </a:p>
@@ -16769,7 +16769,7 @@
           <a:p>
             <a:fld id="{0E82FDCF-6042-5A4E-A2A7-A5FDD0C63025}" type="datetimeFigureOut">
               <a:rPr lang="en-US" smtClean="0"/>
-              <a:t>12/4/21</a:t>
+              <a:t>12/7/21</a:t>
             </a:fld>
             <a:endParaRPr lang="en-US"/>
           </a:p>
@@ -17010,7 +17010,7 @@
           <a:p>
             <a:fld id="{0E82FDCF-6042-5A4E-A2A7-A5FDD0C63025}" type="datetimeFigureOut">
               <a:rPr lang="en-US" smtClean="0"/>
-              <a:t>12/4/21</a:t>
+              <a:t>12/7/21</a:t>
             </a:fld>
             <a:endParaRPr lang="en-US"/>
           </a:p>
@@ -20842,7 +20842,7 @@
             <p:ph idx="1"/>
             <p:extLst>
               <p:ext uri="{D42A27DB-BD31-4B8C-83A1-F6EECF244321}">
-                <p14:modId xmlns:p14="http://schemas.microsoft.com/office/powerpoint/2010/main" val="37351672"/>
+                <p14:modId xmlns:p14="http://schemas.microsoft.com/office/powerpoint/2010/main" val="2621859191"/>
               </p:ext>
             </p:extLst>
           </p:nvPr>

</xml_diff>